<commit_message>
Minor Bugfixes in presentation
</commit_message>
<xml_diff>
--- a/Flutter.pptx
+++ b/Flutter.pptx
@@ -324,7 +324,7 @@
                   <a:schemeClr val="tx2"/>
                 </a:solidFill>
               </a:rPr>
-              <a:t>04.04.2022</a:t>
+              <a:t>24.10.2022</a:t>
             </a:fld>
             <a:endParaRPr lang="de-DE">
               <a:solidFill>
@@ -402,7 +402,7 @@
                   <a:schemeClr val="tx2"/>
                 </a:solidFill>
               </a:rPr>
-              <a:t>‹Nr.›</a:t>
+              <a:t>‹#›</a:t>
             </a:fld>
             <a:endParaRPr lang="de-DE">
               <a:solidFill>
@@ -674,7 +674,7 @@
             <a:fld id="{B4113CCE-1A1A-46DB-884A-AE560F65C3AF}" type="datetimeFigureOut">
               <a:rPr lang="de-DE" smtClean="0"/>
               <a:pPr/>
-              <a:t>04.04.2022</a:t>
+              <a:t>24.10.2022</a:t>
             </a:fld>
             <a:endParaRPr lang="de-DE"/>
           </a:p>
@@ -841,7 +841,7 @@
             <a:fld id="{927DBD90-B360-417B-B4B3-F05A4AFC1996}" type="slidenum">
               <a:rPr lang="de-DE" smtClean="0"/>
               <a:pPr/>
-              <a:t>‹Nr.›</a:t>
+              <a:t>‹#›</a:t>
             </a:fld>
             <a:endParaRPr lang="de-DE"/>
           </a:p>
@@ -5525,7 +5525,7 @@
           <a:p>
             <a:fld id="{132F50A8-BA8D-4396-89E7-EB351FCF61D8}" type="datetime1">
               <a:rPr lang="de-DE" smtClean="0"/>
-              <a:t>04.04.2022</a:t>
+              <a:t>24.10.2022</a:t>
             </a:fld>
             <a:endParaRPr lang="de-DE"/>
           </a:p>
@@ -5570,7 +5570,7 @@
           <a:p>
             <a:fld id="{3A1F27E2-D58A-4028-9FF2-B12D897F257E}" type="slidenum">
               <a:rPr lang="de-DE" smtClean="0"/>
-              <a:t>‹Nr.›</a:t>
+              <a:t>‹#›</a:t>
             </a:fld>
             <a:endParaRPr lang="de-DE"/>
           </a:p>
@@ -5730,7 +5730,7 @@
           <a:p>
             <a:fld id="{D2803228-AD0C-44F6-93E6-E4812D7E72F9}" type="datetime1">
               <a:rPr lang="de-DE" smtClean="0"/>
-              <a:t>04.04.2022</a:t>
+              <a:t>24.10.2022</a:t>
             </a:fld>
             <a:endParaRPr lang="de-DE"/>
           </a:p>
@@ -5775,7 +5775,7 @@
           <a:p>
             <a:fld id="{3A1F27E2-D58A-4028-9FF2-B12D897F257E}" type="slidenum">
               <a:rPr lang="de-DE" smtClean="0"/>
-              <a:t>‹Nr.›</a:t>
+              <a:t>‹#›</a:t>
             </a:fld>
             <a:endParaRPr lang="de-DE"/>
           </a:p>
@@ -5884,7 +5884,7 @@
           <a:p>
             <a:fld id="{E760147F-C8B9-4787-A723-40B4C2E5D24B}" type="datetime1">
               <a:rPr lang="de-DE" smtClean="0"/>
-              <a:t>04.04.2022</a:t>
+              <a:t>24.10.2022</a:t>
             </a:fld>
             <a:endParaRPr lang="de-DE"/>
           </a:p>
@@ -5929,7 +5929,7 @@
           <a:p>
             <a:fld id="{3A1F27E2-D58A-4028-9FF2-B12D897F257E}" type="slidenum">
               <a:rPr lang="de-DE" smtClean="0"/>
-              <a:t>‹Nr.›</a:t>
+              <a:t>‹#›</a:t>
             </a:fld>
             <a:endParaRPr lang="de-DE"/>
           </a:p>
@@ -6121,7 +6121,7 @@
           <a:p>
             <a:fld id="{DD74119D-062E-41F2-BD2B-B524272C39D6}" type="datetime1">
               <a:rPr lang="de-DE" smtClean="0"/>
-              <a:t>04.04.2022</a:t>
+              <a:t>24.10.2022</a:t>
             </a:fld>
             <a:endParaRPr lang="de-DE"/>
           </a:p>
@@ -6166,7 +6166,7 @@
           <a:p>
             <a:fld id="{3A1F27E2-D58A-4028-9FF2-B12D897F257E}" type="slidenum">
               <a:rPr lang="de-DE" smtClean="0"/>
-              <a:t>‹Nr.›</a:t>
+              <a:t>‹#›</a:t>
             </a:fld>
             <a:endParaRPr lang="de-DE"/>
           </a:p>
@@ -6297,7 +6297,7 @@
           <a:p>
             <a:fld id="{E2963D44-900F-4368-9939-FAC49CE50632}" type="datetime1">
               <a:rPr lang="de-DE" smtClean="0"/>
-              <a:t>04.04.2022</a:t>
+              <a:t>24.10.2022</a:t>
             </a:fld>
             <a:endParaRPr lang="de-DE"/>
           </a:p>
@@ -6342,7 +6342,7 @@
           <a:p>
             <a:fld id="{3A1F27E2-D58A-4028-9FF2-B12D897F257E}" type="slidenum">
               <a:rPr lang="de-DE" smtClean="0"/>
-              <a:t>‹Nr.›</a:t>
+              <a:t>‹#›</a:t>
             </a:fld>
             <a:endParaRPr lang="de-DE"/>
           </a:p>
@@ -6473,7 +6473,7 @@
           <a:p>
             <a:fld id="{8FBC7B46-8F3E-413F-A409-09BE3933FF5F}" type="datetime1">
               <a:rPr lang="de-DE" smtClean="0"/>
-              <a:t>04.04.2022</a:t>
+              <a:t>24.10.2022</a:t>
             </a:fld>
             <a:endParaRPr lang="de-DE"/>
           </a:p>
@@ -6518,7 +6518,7 @@
           <a:p>
             <a:fld id="{3A1F27E2-D58A-4028-9FF2-B12D897F257E}" type="slidenum">
               <a:rPr lang="de-DE" smtClean="0"/>
-              <a:t>‹Nr.›</a:t>
+              <a:t>‹#›</a:t>
             </a:fld>
             <a:endParaRPr lang="de-DE"/>
           </a:p>
@@ -6623,7 +6623,7 @@
           <a:p>
             <a:fld id="{A9955078-0FE7-4328-8BC4-FC50AC67DFE6}" type="datetime1">
               <a:rPr lang="de-DE" smtClean="0"/>
-              <a:t>04.04.2022</a:t>
+              <a:t>24.10.2022</a:t>
             </a:fld>
             <a:endParaRPr lang="de-DE"/>
           </a:p>
@@ -6668,7 +6668,7 @@
           <a:p>
             <a:fld id="{3A1F27E2-D58A-4028-9FF2-B12D897F257E}" type="slidenum">
               <a:rPr lang="de-DE" smtClean="0"/>
-              <a:t>‹Nr.›</a:t>
+              <a:t>‹#›</a:t>
             </a:fld>
             <a:endParaRPr lang="de-DE"/>
           </a:p>
@@ -6721,7 +6721,7 @@
           <a:p>
             <a:fld id="{8F6163C9-7413-43CA-8F9A-2D9407EA485A}" type="datetime1">
               <a:rPr lang="de-DE" smtClean="0"/>
-              <a:t>04.04.2022</a:t>
+              <a:t>24.10.2022</a:t>
             </a:fld>
             <a:endParaRPr lang="de-DE"/>
           </a:p>
@@ -6766,7 +6766,7 @@
           <a:p>
             <a:fld id="{3A1F27E2-D58A-4028-9FF2-B12D897F257E}" type="slidenum">
               <a:rPr lang="de-DE" smtClean="0"/>
-              <a:t>‹Nr.›</a:t>
+              <a:t>‹#›</a:t>
             </a:fld>
             <a:endParaRPr lang="de-DE"/>
           </a:p>
@@ -6845,7 +6845,7 @@
           <a:p>
             <a:fld id="{C01788FA-61B2-435C-8A36-8A31A7FB2F57}" type="datetime1">
               <a:rPr lang="de-DE" smtClean="0"/>
-              <a:t>04.04.2022</a:t>
+              <a:t>24.10.2022</a:t>
             </a:fld>
             <a:endParaRPr lang="de-DE"/>
           </a:p>
@@ -6890,7 +6890,7 @@
           <a:p>
             <a:fld id="{3A1F27E2-D58A-4028-9FF2-B12D897F257E}" type="slidenum">
               <a:rPr lang="de-DE" smtClean="0"/>
-              <a:t>‹Nr.›</a:t>
+              <a:t>‹#›</a:t>
             </a:fld>
             <a:endParaRPr lang="de-DE"/>
           </a:p>
@@ -7029,7 +7029,7 @@
           <a:p>
             <a:fld id="{C2C9336C-39C3-4C5D-990F-AC5007C5DC0D}" type="datetime1">
               <a:rPr lang="de-DE" smtClean="0"/>
-              <a:t>04.04.2022</a:t>
+              <a:t>24.10.2022</a:t>
             </a:fld>
             <a:endParaRPr lang="de-DE"/>
           </a:p>
@@ -7074,7 +7074,7 @@
           <a:p>
             <a:fld id="{3A1F27E2-D58A-4028-9FF2-B12D897F257E}" type="slidenum">
               <a:rPr lang="de-DE" smtClean="0"/>
-              <a:t>‹Nr.›</a:t>
+              <a:t>‹#›</a:t>
             </a:fld>
             <a:endParaRPr lang="de-DE"/>
           </a:p>
@@ -7234,7 +7234,7 @@
           <a:p>
             <a:fld id="{4EAB81E7-A98B-4BC1-8CA5-594FD3D28D09}" type="datetime1">
               <a:rPr lang="de-DE" smtClean="0"/>
-              <a:t>04.04.2022</a:t>
+              <a:t>24.10.2022</a:t>
             </a:fld>
             <a:endParaRPr lang="de-DE"/>
           </a:p>
@@ -7279,7 +7279,7 @@
           <a:p>
             <a:fld id="{3A1F27E2-D58A-4028-9FF2-B12D897F257E}" type="slidenum">
               <a:rPr lang="de-DE" smtClean="0"/>
-              <a:t>‹Nr.›</a:t>
+              <a:t>‹#›</a:t>
             </a:fld>
             <a:endParaRPr lang="de-DE"/>
           </a:p>
@@ -7592,7 +7592,7 @@
           <a:p>
             <a:fld id="{E1F54266-E5D2-44F7-B2D3-A3F761CF28B5}" type="datetime1">
               <a:rPr lang="de-DE" smtClean="0"/>
-              <a:t>04.04.2022</a:t>
+              <a:t>24.10.2022</a:t>
             </a:fld>
             <a:endParaRPr lang="de-DE" dirty="0"/>
           </a:p>
@@ -7679,7 +7679,7 @@
             <a:fld id="{3A1F27E2-D58A-4028-9FF2-B12D897F257E}" type="slidenum">
               <a:rPr lang="de-DE" smtClean="0"/>
               <a:pPr/>
-              <a:t>‹Nr.›</a:t>
+              <a:t>‹#›</a:t>
             </a:fld>
             <a:endParaRPr lang="de-DE"/>
           </a:p>
@@ -8233,7 +8233,7 @@
           <a:p>
             <a:fld id="{F89D49DA-894B-48ED-9781-F360E0DDDDC5}" type="datetime1">
               <a:rPr lang="de-DE" smtClean="0"/>
-              <a:t>04.04.2022</a:t>
+              <a:t>24.10.2022</a:t>
             </a:fld>
             <a:endParaRPr lang="de-DE" dirty="0"/>
           </a:p>
@@ -8320,7 +8320,7 @@
             <a:fld id="{3A1F27E2-D58A-4028-9FF2-B12D897F257E}" type="slidenum">
               <a:rPr lang="de-DE" smtClean="0"/>
               <a:pPr/>
-              <a:t>‹Nr.›</a:t>
+              <a:t>‹#›</a:t>
             </a:fld>
             <a:endParaRPr lang="de-DE" dirty="0"/>
           </a:p>
@@ -8931,7 +8931,7 @@
           <a:p>
             <a:fld id="{91AA5D2D-D8D9-4280-8062-7C7597629FAF}" type="datetime1">
               <a:rPr lang="de-DE" smtClean="0"/>
-              <a:t>04.04.2022</a:t>
+              <a:t>24.10.2022</a:t>
             </a:fld>
             <a:endParaRPr lang="de-DE"/>
           </a:p>
@@ -9116,7 +9116,7 @@
           <a:p>
             <a:fld id="{6692642C-ADFE-4628-9745-F6048AB1BBC1}" type="datetime1">
               <a:rPr lang="de-DE" smtClean="0"/>
-              <a:t>04.04.2022</a:t>
+              <a:t>24.10.2022</a:t>
             </a:fld>
             <a:endParaRPr lang="de-DE"/>
           </a:p>
@@ -9428,7 +9428,7 @@
           <a:p>
             <a:fld id="{B0D1DB5C-C8CC-4D9E-B419-71C3E105DAC7}" type="datetime1">
               <a:rPr lang="de-DE" smtClean="0"/>
-              <a:t>04.04.2022</a:t>
+              <a:t>24.10.2022</a:t>
             </a:fld>
             <a:endParaRPr lang="de-DE"/>
           </a:p>
@@ -9646,7 +9646,7 @@
           <a:p>
             <a:fld id="{B8D36588-33F3-4043-8CC0-89AA6CE13B07}" type="datetime1">
               <a:rPr lang="de-DE" smtClean="0"/>
-              <a:t>04.04.2022</a:t>
+              <a:t>24.10.2022</a:t>
             </a:fld>
             <a:endParaRPr lang="de-DE"/>
           </a:p>
@@ -9902,7 +9902,7 @@
           <a:p>
             <a:fld id="{D76081BF-3DEA-4786-9616-0B04952723CC}" type="datetime1">
               <a:rPr lang="de-DE" smtClean="0"/>
-              <a:t>04.04.2022</a:t>
+              <a:t>24.10.2022</a:t>
             </a:fld>
             <a:endParaRPr lang="de-DE"/>
           </a:p>
@@ -10387,7 +10387,7 @@
           <a:p>
             <a:fld id="{66375279-55E9-4CB9-A301-D67E66436B7E}" type="datetime1">
               <a:rPr lang="de-DE" smtClean="0"/>
-              <a:t>04.04.2022</a:t>
+              <a:t>24.10.2022</a:t>
             </a:fld>
             <a:endParaRPr lang="de-DE"/>
           </a:p>
@@ -10727,7 +10727,7 @@
           <a:p>
             <a:fld id="{2EBEF85F-5E75-48B0-9150-A62C7887D08C}" type="datetime1">
               <a:rPr lang="de-DE" smtClean="0"/>
-              <a:t>04.04.2022</a:t>
+              <a:t>24.10.2022</a:t>
             </a:fld>
             <a:endParaRPr lang="de-DE"/>
           </a:p>
@@ -10854,7 +10854,7 @@
           <a:p>
             <a:fld id="{2F3464F9-73CA-41D0-98B8-8C50925281DB}" type="datetime1">
               <a:rPr lang="de-DE" smtClean="0"/>
-              <a:t>04.04.2022</a:t>
+              <a:t>24.10.2022</a:t>
             </a:fld>
             <a:endParaRPr lang="de-DE"/>
           </a:p>
@@ -11105,7 +11105,7 @@
           <a:p>
             <a:fld id="{A7EE04C5-D8AF-493F-BA42-C36D68EF1030}" type="datetime1">
               <a:rPr lang="de-DE" smtClean="0"/>
-              <a:t>04.04.2022</a:t>
+              <a:t>24.10.2022</a:t>
             </a:fld>
             <a:endParaRPr lang="de-DE"/>
           </a:p>
@@ -11515,7 +11515,7 @@
           <a:p>
             <a:fld id="{D8F310A7-37AC-4473-A5D8-44A28983651A}" type="datetime1">
               <a:rPr lang="de-DE" smtClean="0"/>
-              <a:t>04.04.2022</a:t>
+              <a:t>24.10.2022</a:t>
             </a:fld>
             <a:endParaRPr lang="de-DE"/>
           </a:p>
@@ -11789,7 +11789,7 @@
           <a:p>
             <a:fld id="{495EAA2B-74DA-4E05-8B5E-0EE1375AECED}" type="datetime1">
               <a:rPr lang="de-DE" smtClean="0"/>
-              <a:t>04.04.2022</a:t>
+              <a:t>24.10.2022</a:t>
             </a:fld>
             <a:endParaRPr lang="de-DE"/>
           </a:p>
@@ -11968,7 +11968,7 @@
           <a:p>
             <a:fld id="{9E7ED0AC-3DB0-44AF-A3CA-2435FC0252CA}" type="datetime1">
               <a:rPr lang="de-DE" smtClean="0"/>
-              <a:t>04.04.2022</a:t>
+              <a:t>24.10.2022</a:t>
             </a:fld>
             <a:endParaRPr lang="de-DE"/>
           </a:p>
@@ -12133,7 +12133,7 @@
           <a:p>
             <a:fld id="{F672D7B2-F484-45E4-98E5-7289A8581550}" type="datetime1">
               <a:rPr lang="de-DE" smtClean="0"/>
-              <a:t>04.04.2022</a:t>
+              <a:t>24.10.2022</a:t>
             </a:fld>
             <a:endParaRPr lang="de-DE"/>
           </a:p>
@@ -12570,7 +12570,7 @@
           <a:p>
             <a:fld id="{A662022A-9782-449F-8996-5AB9F16DE610}" type="datetime1">
               <a:rPr lang="de-DE" smtClean="0"/>
-              <a:t>04.04.2022</a:t>
+              <a:t>24.10.2022</a:t>
             </a:fld>
             <a:endParaRPr lang="de-DE"/>
           </a:p>
@@ -12719,7 +12719,7 @@
           <a:p>
             <a:fld id="{8B4BFAD3-CABA-4777-94E2-AE7BFE6F7C61}" type="datetime1">
               <a:rPr lang="de-DE" smtClean="0"/>
-              <a:t>04.04.2022</a:t>
+              <a:t>24.10.2022</a:t>
             </a:fld>
             <a:endParaRPr lang="de-DE"/>
           </a:p>
@@ -13333,7 +13333,7 @@
           <a:p>
             <a:fld id="{48E90E66-0467-4AEA-A023-C61E7610AE6C}" type="datetime1">
               <a:rPr lang="de-DE" smtClean="0"/>
-              <a:t>04.04.2022</a:t>
+              <a:t>24.10.2022</a:t>
             </a:fld>
             <a:endParaRPr lang="de-DE"/>
           </a:p>
@@ -14166,7 +14166,7 @@
           <a:p>
             <a:fld id="{83B8C5D4-B941-498C-B35F-986BE4871841}" type="datetime1">
               <a:rPr lang="de-DE" smtClean="0"/>
-              <a:t>04.04.2022</a:t>
+              <a:t>24.10.2022</a:t>
             </a:fld>
             <a:endParaRPr lang="de-DE"/>
           </a:p>
@@ -14490,7 +14490,7 @@
           <a:p>
             <a:fld id="{AB3D0F18-C2D3-4E30-99E2-FE11FFF7F662}" type="datetime1">
               <a:rPr lang="de-DE" smtClean="0"/>
-              <a:t>04.04.2022</a:t>
+              <a:t>24.10.2022</a:t>
             </a:fld>
             <a:endParaRPr lang="de-DE"/>
           </a:p>
@@ -14758,8 +14758,13 @@
             <a:pPr lvl="2"/>
             <a:r>
               <a:rPr lang="de-DE" dirty="0"/>
-              <a:t>Radio</a:t>
-            </a:r>
+              <a:t>Radio / </a:t>
+            </a:r>
+            <a:r>
+              <a:rPr lang="de-DE" dirty="0" err="1"/>
+              <a:t>RadioListTile</a:t>
+            </a:r>
+            <a:endParaRPr lang="de-DE" dirty="0"/>
           </a:p>
           <a:p>
             <a:pPr lvl="2"/>
@@ -14810,7 +14815,7 @@
           <a:p>
             <a:fld id="{F55F74BC-9915-4699-A85A-73B174968EE1}" type="datetime1">
               <a:rPr lang="de-DE" smtClean="0"/>
-              <a:t>04.04.2022</a:t>
+              <a:t>24.10.2022</a:t>
             </a:fld>
             <a:endParaRPr lang="de-DE"/>
           </a:p>
@@ -14966,7 +14971,7 @@
           <a:p>
             <a:fld id="{760A13BD-D206-43F3-B0DA-62E58E851B6F}" type="datetime1">
               <a:rPr lang="de-DE" smtClean="0"/>
-              <a:t>04.04.2022</a:t>
+              <a:t>24.10.2022</a:t>
             </a:fld>
             <a:endParaRPr lang="de-DE"/>
           </a:p>
@@ -15138,7 +15143,7 @@
           <a:p>
             <a:fld id="{56DFBC0F-2AD9-4BBC-8358-13DC94873D8C}" type="datetime1">
               <a:rPr lang="de-DE" smtClean="0"/>
-              <a:t>04.04.2022</a:t>
+              <a:t>24.10.2022</a:t>
             </a:fld>
             <a:endParaRPr lang="de-DE"/>
           </a:p>
@@ -15455,7 +15460,7 @@
           <a:p>
             <a:fld id="{8068BB5F-B3A7-4ED2-9A23-0C8985343DF4}" type="datetime1">
               <a:rPr lang="de-DE" smtClean="0"/>
-              <a:t>04.04.2022</a:t>
+              <a:t>24.10.2022</a:t>
             </a:fld>
             <a:endParaRPr lang="de-DE"/>
           </a:p>
@@ -15670,7 +15675,7 @@
           <a:p>
             <a:fld id="{C7FF6B60-67F4-4647-BEAE-9A0BA6C4FD42}" type="datetime1">
               <a:rPr lang="de-DE" smtClean="0"/>
-              <a:t>04.04.2022</a:t>
+              <a:t>24.10.2022</a:t>
             </a:fld>
             <a:endParaRPr lang="de-DE"/>
           </a:p>
@@ -15896,8 +15901,20 @@
           <a:p>
             <a:pPr lvl="1"/>
             <a:r>
-              <a:rPr lang="de-DE" dirty="0"/>
-              <a:t>Füge einen Knopf hinzu, der zu einer neuen Seite navigiert.</a:t>
+              <a:rPr lang="de-DE"/>
+              <a:t>Füge eine Schaltfläche </a:t>
+            </a:r>
+            <a:r>
+              <a:rPr lang="de-DE" dirty="0"/>
+              <a:t>hinzu</a:t>
+            </a:r>
+            <a:r>
+              <a:rPr lang="de-DE"/>
+              <a:t>, die </a:t>
+            </a:r>
+            <a:r>
+              <a:rPr lang="de-DE" dirty="0"/>
+              <a:t>zu einer neuen Seite navigiert.</a:t>
             </a:r>
           </a:p>
           <a:p>
@@ -15926,7 +15943,7 @@
           <a:p>
             <a:fld id="{88F9B55F-5D0F-455E-8902-7E3895ACA0B1}" type="datetime1">
               <a:rPr lang="de-DE" smtClean="0"/>
-              <a:t>04.04.2022</a:t>
+              <a:t>24.10.2022</a:t>
             </a:fld>
             <a:endParaRPr lang="de-DE"/>
           </a:p>
@@ -16187,7 +16204,7 @@
           <a:p>
             <a:fld id="{889A0BFD-EFA2-4482-97DD-B9D9AB233173}" type="datetime1">
               <a:rPr lang="de-DE" smtClean="0"/>
-              <a:t>04.04.2022</a:t>
+              <a:t>24.10.2022</a:t>
             </a:fld>
             <a:endParaRPr lang="de-DE"/>
           </a:p>
@@ -16355,7 +16372,7 @@
           <a:p>
             <a:fld id="{88699421-9AD5-47E9-926A-F65DD9B03E3D}" type="datetime1">
               <a:rPr lang="de-DE" smtClean="0"/>
-              <a:t>04.04.2022</a:t>
+              <a:t>24.10.2022</a:t>
             </a:fld>
             <a:endParaRPr lang="de-DE"/>
           </a:p>
@@ -17576,7 +17593,7 @@
           <a:p>
             <a:fld id="{0B58690B-47B4-4A07-9308-8F546D528B89}" type="datetime1">
               <a:rPr lang="de-DE" smtClean="0"/>
-              <a:t>04.04.2022</a:t>
+              <a:t>24.10.2022</a:t>
             </a:fld>
             <a:endParaRPr lang="de-DE"/>
           </a:p>
@@ -17953,7 +17970,7 @@
           <a:p>
             <a:fld id="{F664738E-493C-437F-BD1C-1D9623E88A81}" type="datetime1">
               <a:rPr lang="de-DE" smtClean="0"/>
-              <a:t>04.04.2022</a:t>
+              <a:t>24.10.2022</a:t>
             </a:fld>
             <a:endParaRPr lang="de-DE"/>
           </a:p>
@@ -18241,7 +18258,7 @@
           <a:p>
             <a:fld id="{3D860191-32A4-440D-8D29-B6C03C6293C5}" type="datetime1">
               <a:rPr lang="de-DE" smtClean="0"/>
-              <a:t>04.04.2022</a:t>
+              <a:t>24.10.2022</a:t>
             </a:fld>
             <a:endParaRPr lang="de-DE"/>
           </a:p>
@@ -18431,7 +18448,7 @@
           <a:p>
             <a:fld id="{BC1CFF34-78CD-47AC-B9A6-270415EEFEFD}" type="datetime1">
               <a:rPr lang="de-DE" smtClean="0"/>
-              <a:t>04.04.2022</a:t>
+              <a:t>24.10.2022</a:t>
             </a:fld>
             <a:endParaRPr lang="de-DE"/>
           </a:p>
@@ -18551,7 +18568,7 @@
           <a:p>
             <a:fld id="{1A519B81-2E36-4722-8DD7-20EF9EF88EBB}" type="datetime1">
               <a:rPr lang="de-DE" smtClean="0"/>
-              <a:t>04.04.2022</a:t>
+              <a:t>24.10.2022</a:t>
             </a:fld>
             <a:endParaRPr lang="de-DE"/>
           </a:p>
@@ -18737,7 +18754,7 @@
           <a:p>
             <a:fld id="{36E68F7E-A201-451C-86FC-B8A53AA7613A}" type="datetime1">
               <a:rPr lang="de-DE" smtClean="0"/>
-              <a:t>04.04.2022</a:t>
+              <a:t>24.10.2022</a:t>
             </a:fld>
             <a:endParaRPr lang="de-DE"/>
           </a:p>
@@ -19148,7 +19165,7 @@
           <a:p>
             <a:fld id="{4FDA0AD4-661A-4811-A36B-E4D56D2B5F68}" type="datetime1">
               <a:rPr lang="de-DE" smtClean="0"/>
-              <a:t>04.04.2022</a:t>
+              <a:t>24.10.2022</a:t>
             </a:fld>
             <a:endParaRPr lang="de-DE"/>
           </a:p>
@@ -19624,7 +19641,7 @@
           <a:p>
             <a:fld id="{6E1D8742-B9EF-4A1F-B470-F7F45BE6C603}" type="datetime1">
               <a:rPr lang="de-DE" smtClean="0"/>
-              <a:t>04.04.2022</a:t>
+              <a:t>24.10.2022</a:t>
             </a:fld>
             <a:endParaRPr lang="de-DE"/>
           </a:p>
@@ -20045,7 +20062,7 @@
           <a:p>
             <a:fld id="{288225EB-A702-423B-AF5E-CD53297FC0EF}" type="datetime1">
               <a:rPr lang="de-DE" smtClean="0"/>
-              <a:t>04.04.2022</a:t>
+              <a:t>24.10.2022</a:t>
             </a:fld>
             <a:endParaRPr lang="de-DE"/>
           </a:p>
@@ -20447,7 +20464,7 @@
           <a:p>
             <a:fld id="{AE7FCC2D-734B-4135-8325-1C04FE33BDD0}" type="datetime1">
               <a:rPr lang="de-DE" smtClean="0"/>
-              <a:t>04.04.2022</a:t>
+              <a:t>24.10.2022</a:t>
             </a:fld>
             <a:endParaRPr lang="de-DE"/>
           </a:p>
@@ -20590,7 +20607,7 @@
           <a:p>
             <a:fld id="{F667A287-2C6A-41A7-8A3F-261C235AEF21}" type="datetime1">
               <a:rPr lang="de-DE" smtClean="0"/>
-              <a:t>04.04.2022</a:t>
+              <a:t>24.10.2022</a:t>
             </a:fld>
             <a:endParaRPr lang="de-DE"/>
           </a:p>

</xml_diff>